<commit_message>
update presentation and note
</commit_message>
<xml_diff>
--- a/P7_5_presentation.pptx
+++ b/P7_5_presentation.pptx
@@ -4202,9 +4202,16 @@
             <p:ph type="subTitle" idx="1"/>
           </p:nvPr>
         </p:nvSpPr>
-        <p:spPr/>
+        <p:spPr>
+          <a:xfrm>
+            <a:off x="685800" y="3505200"/>
+            <a:ext cx="8278688" cy="1752600"/>
+          </a:xfrm>
+        </p:spPr>
         <p:txBody>
-          <a:bodyPr/>
+          <a:bodyPr>
+            <a:normAutofit lnSpcReduction="10000"/>
+          </a:bodyPr>
           <a:lstStyle/>
           <a:p>
             <a:r>
@@ -4224,9 +4231,35 @@
             </a:r>
             <a:r>
               <a:rPr lang="fr-FR" dirty="0" err="1"/>
-              <a:t>Ravot-Boutherre</a:t>
+              <a:t>Ravot</a:t>
+            </a:r>
+            <a:r>
+              <a:rPr lang="fr-FR" dirty="0"/>
+              <a:t>-Boutherre</a:t>
+            </a:r>
+          </a:p>
+          <a:p>
+            <a:r>
+              <a:rPr lang="fr-FR" dirty="0"/>
+              <a:t>code: </a:t>
+            </a:r>
+            <a:r>
+              <a:rPr lang="fr-FR" dirty="0">
+                <a:hlinkClick r:id="rId3"/>
+              </a:rPr>
+              <a:t>https://github.com/IsabelleRB1/OpenClassroom</a:t>
             </a:r>
             <a:endParaRPr lang="fr-FR" dirty="0"/>
+          </a:p>
+          <a:p>
+            <a:r>
+              <a:rPr lang="fr-FR" dirty="0" err="1"/>
+              <a:t>dashboard</a:t>
+            </a:r>
+            <a:r>
+              <a:rPr lang="fr-FR" dirty="0"/>
+              <a:t>: https://creditdashboard.herokuapp.com/</a:t>
+            </a:r>
           </a:p>
         </p:txBody>
       </p:sp>
@@ -4387,26 +4420,26 @@
           </a:bodyPr>
           <a:lstStyle/>
           <a:p>
+            <a:pPr marL="455930" indent="-285750"/>
+            <a:r>
+              <a:rPr lang="en-US" sz="2200" dirty="0"/>
+              <a:t>Build a model able to predict whether the loan should be granted or not</a:t>
+            </a:r>
+          </a:p>
+          <a:p>
             <a:pPr marL="730250" lvl="1" indent="-285750"/>
             <a:r>
               <a:rPr lang="en-US" sz="1800" dirty="0"/>
-              <a:t>Build a model able to predict whether the loan should be granted or not</a:t>
-            </a:r>
-          </a:p>
-          <a:p>
-            <a:pPr marL="1004570" lvl="2" indent="-285750"/>
-            <a:r>
-              <a:rPr lang="en-US" sz="1600" dirty="0"/>
               <a:t>This model takes into account the business need: </a:t>
             </a:r>
             <a:r>
-              <a:rPr lang="en-US" sz="1600" dirty="0">
+              <a:rPr lang="en-US" sz="1800" dirty="0">
                 <a:cs typeface="Times New Roman" panose="02020603050405020304" pitchFamily="18" charset="0"/>
               </a:rPr>
               <a:t>wrongly g</a:t>
             </a:r>
             <a:r>
-              <a:rPr lang="en-US" sz="1600" dirty="0">
+              <a:rPr lang="en-US" sz="1800" dirty="0">
                 <a:effectLst/>
                 <a:ea typeface="Calibri" panose="020F0502020204030204" pitchFamily="34" charset="0"/>
                 <a:cs typeface="Times New Roman" panose="02020603050405020304" pitchFamily="18" charset="0"/>
@@ -4415,7 +4448,7 @@
             </a:r>
           </a:p>
           <a:p>
-            <a:pPr marL="730250" lvl="1" indent="-285750"/>
+            <a:pPr marL="455930" indent="-285750"/>
             <a:r>
               <a:rPr lang="en-US" dirty="0">
                 <a:cs typeface="Times New Roman" panose="02020603050405020304" pitchFamily="18" charset="0"/>
@@ -4424,7 +4457,7 @@
             </a:r>
           </a:p>
           <a:p>
-            <a:pPr marL="730250" lvl="1" indent="-285750"/>
+            <a:pPr marL="455930" indent="-285750"/>
             <a:r>
               <a:rPr lang="en-US" dirty="0">
                 <a:cs typeface="Times New Roman" panose="02020603050405020304" pitchFamily="18" charset="0"/>
@@ -4433,7 +4466,7 @@
             </a:r>
           </a:p>
           <a:p>
-            <a:pPr marL="1004570" lvl="2" indent="-285750"/>
+            <a:pPr marL="730250" lvl="1" indent="-285750"/>
             <a:r>
               <a:rPr lang="en-US" dirty="0">
                 <a:cs typeface="Times New Roman" panose="02020603050405020304" pitchFamily="18" charset="0"/>
@@ -4454,7 +4487,7 @@
             </a:r>
           </a:p>
           <a:p>
-            <a:pPr marL="1004570" lvl="2" indent="-285750"/>
+            <a:pPr marL="730250" lvl="1" indent="-285750"/>
             <a:r>
               <a:rPr lang="en-US" dirty="0">
                 <a:cs typeface="Times New Roman" panose="02020603050405020304" pitchFamily="18" charset="0"/>
@@ -4463,7 +4496,7 @@
             </a:r>
           </a:p>
           <a:p>
-            <a:pPr marL="1004570" lvl="2" indent="-285750"/>
+            <a:pPr marL="730250" lvl="1" indent="-285750"/>
             <a:r>
               <a:rPr lang="en-US" dirty="0">
                 <a:cs typeface="Times New Roman" panose="02020603050405020304" pitchFamily="18" charset="0"/>
@@ -4472,20 +4505,39 @@
             </a:r>
           </a:p>
           <a:p>
-            <a:pPr marL="1004570" lvl="2" indent="-285750"/>
+            <a:pPr marL="730250" lvl="1" indent="-285750"/>
             <a:r>
               <a:rPr lang="en-US" dirty="0">
                 <a:cs typeface="Times New Roman" panose="02020603050405020304" pitchFamily="18" charset="0"/>
               </a:rPr>
               <a:t>Test more models </a:t>
             </a:r>
-            <a:endParaRPr lang="en-US" dirty="0"/>
-          </a:p>
-          <a:p>
-            <a:pPr marL="444500" lvl="1" indent="0">
-              <a:buNone/>
-            </a:pPr>
             <a:endParaRPr lang="en-US" sz="1800" dirty="0"/>
+          </a:p>
+          <a:p>
+            <a:pPr marL="444500" indent="-261938"/>
+            <a:r>
+              <a:rPr lang="fr-FR" sz="2000" dirty="0"/>
+              <a:t>code: </a:t>
+            </a:r>
+            <a:r>
+              <a:rPr lang="fr-FR" sz="2000" dirty="0">
+                <a:hlinkClick r:id="rId3"/>
+              </a:rPr>
+              <a:t>https://github.com/IsabelleRB1/OpenClassroom</a:t>
+            </a:r>
+            <a:endParaRPr lang="fr-FR" sz="2000" dirty="0"/>
+          </a:p>
+          <a:p>
+            <a:pPr marL="444500" indent="-261938"/>
+            <a:r>
+              <a:rPr lang="fr-FR" sz="2000" dirty="0" err="1"/>
+              <a:t>dashboard</a:t>
+            </a:r>
+            <a:r>
+              <a:rPr lang="fr-FR" sz="2000" dirty="0"/>
+              <a:t>: https://creditdashboard.herokuapp.com/</a:t>
+            </a:r>
           </a:p>
           <a:p>
             <a:pPr marL="444500" lvl="1" indent="0">
@@ -8166,13 +8218,13 @@
                       <a:rPr lang="fr-FR" sz="1400" b="0" i="1" smtClean="0">
                         <a:latin typeface="Cambria Math" panose="02040503050406030204" pitchFamily="18" charset="0"/>
                       </a:rPr>
-                      <m:t>𝐸𝑚𝑒𝑡𝑟𝑖𝑐𝑛𝑜𝑟𝑚</m:t>
+                      <m:t>𝐸𝑚𝑒𝑡𝑟𝑖𝑐𝑛𝑜𝑟𝑚𝑎</m:t>
                     </m:r>
                     <m:r>
                       <a:rPr lang="fr-FR" sz="1400" b="0" i="1" baseline="-25000" smtClean="0">
                         <a:latin typeface="Cambria Math" panose="02040503050406030204" pitchFamily="18" charset="0"/>
                       </a:rPr>
-                      <m:t>𝑎𝑙𝑖𝑧𝑒𝑑</m:t>
+                      <m:t>𝑙𝑖𝑧𝑒𝑑</m:t>
                     </m:r>
                     <m:r>
                       <a:rPr lang="fr-FR" sz="1400" b="0" i="1" smtClean="0">
@@ -11310,36 +11362,6 @@
           </a:p>
         </p:txBody>
       </p:sp>
-      <p:pic>
-        <p:nvPicPr>
-          <p:cNvPr id="5" name="Image 4">
-            <a:extLst>
-              <a:ext uri="{FF2B5EF4-FFF2-40B4-BE49-F238E27FC236}">
-                <a16:creationId xmlns:a16="http://schemas.microsoft.com/office/drawing/2014/main" id="{84C2E967-5262-48B0-AC67-BB5FA32E615F}"/>
-              </a:ext>
-            </a:extLst>
-          </p:cNvPr>
-          <p:cNvPicPr>
-            <a:picLocks noChangeAspect="1"/>
-          </p:cNvPicPr>
-          <p:nvPr/>
-        </p:nvPicPr>
-        <p:blipFill>
-          <a:blip r:embed="rId2"/>
-          <a:stretch>
-            <a:fillRect/>
-          </a:stretch>
-        </p:blipFill>
-        <p:spPr>
-          <a:xfrm>
-            <a:off x="1187624" y="2924944"/>
-            <a:ext cx="5574488" cy="2923207"/>
-          </a:xfrm>
-          <a:prstGeom prst="rect">
-            <a:avLst/>
-          </a:prstGeom>
-        </p:spPr>
-      </p:pic>
       <p:sp>
         <p:nvSpPr>
           <p:cNvPr id="6" name="Espace réservé du contenu 2">
@@ -11784,6 +11806,53 @@
           </a:p>
         </p:txBody>
       </p:sp>
+      <p:pic>
+        <p:nvPicPr>
+          <p:cNvPr id="1026" name="Picture 2">
+            <a:extLst>
+              <a:ext uri="{FF2B5EF4-FFF2-40B4-BE49-F238E27FC236}">
+                <a16:creationId xmlns:a16="http://schemas.microsoft.com/office/drawing/2014/main" id="{3B9AE887-4046-4BBE-A5E9-6200B554A3FD}"/>
+              </a:ext>
+            </a:extLst>
+          </p:cNvPr>
+          <p:cNvPicPr>
+            <a:picLocks noChangeAspect="1" noChangeArrowheads="1"/>
+          </p:cNvPicPr>
+          <p:nvPr/>
+        </p:nvPicPr>
+        <p:blipFill>
+          <a:blip r:embed="rId2">
+            <a:extLst>
+              <a:ext uri="{28A0092B-C50C-407E-A947-70E740481C1C}">
+                <a14:useLocalDpi xmlns:a14="http://schemas.microsoft.com/office/drawing/2010/main" val="0"/>
+              </a:ext>
+            </a:extLst>
+          </a:blip>
+          <a:srcRect/>
+          <a:stretch>
+            <a:fillRect/>
+          </a:stretch>
+        </p:blipFill>
+        <p:spPr bwMode="auto">
+          <a:xfrm>
+            <a:off x="1691680" y="2708920"/>
+            <a:ext cx="5904656" cy="3096344"/>
+          </a:xfrm>
+          <a:prstGeom prst="rect">
+            <a:avLst/>
+          </a:prstGeom>
+          <a:noFill/>
+          <a:extLst>
+            <a:ext uri="{909E8E84-426E-40DD-AFC4-6F175D3DCCD1}">
+              <a14:hiddenFill xmlns:a14="http://schemas.microsoft.com/office/drawing/2010/main">
+                <a:solidFill>
+                  <a:srgbClr val="FFFFFF"/>
+                </a:solidFill>
+              </a14:hiddenFill>
+            </a:ext>
+          </a:extLst>
+        </p:spPr>
+      </p:pic>
     </p:spTree>
     <p:extLst>
       <p:ext uri="{BB962C8B-B14F-4D97-AF65-F5344CB8AC3E}">

</xml_diff>